<commit_message>
docs: An minimal aesthetic change
Just to get rid of the red lines that were around a text’s box.
</commit_message>
<xml_diff>
--- a/doc/images/fiware_architecture.pptx
+++ b/doc/images/fiware_architecture.pptx
@@ -104,6 +104,22 @@
       </a:defRPr>
     </a:lvl9pPr>
   </p:defaultTextStyle>
+  <p:extLst>
+    <p:ext uri="{EFAFB233-063F-42B5-8137-9DF3F51BA10A}">
+      <p15:sldGuideLst xmlns:p15="http://schemas.microsoft.com/office/powerpoint/2012/main">
+        <p15:guide id="1" orient="horz" pos="2160">
+          <p15:clr>
+            <a:srgbClr val="A4A3A4"/>
+          </p15:clr>
+        </p15:guide>
+        <p15:guide id="2" pos="2880">
+          <p15:clr>
+            <a:srgbClr val="A4A3A4"/>
+          </p15:clr>
+        </p15:guide>
+      </p15:sldGuideLst>
+    </p:ext>
+  </p:extLst>
 </p:presentation>
 </file>
 
@@ -288,7 +304,7 @@
           <a:p>
             <a:fld id="{2B812C4B-C41B-974A-BF45-1844492AFCF9}" type="datetimeFigureOut">
               <a:rPr lang="es-ES" smtClean="0"/>
-              <a:t>25/10/16</a:t>
+              <a:t>31/1/17</a:t>
             </a:fld>
             <a:endParaRPr lang="es-ES"/>
           </a:p>
@@ -330,7 +346,7 @@
           <a:p>
             <a:fld id="{5D4D0645-9ACD-C847-B29C-B56C0E1FB878}" type="slidenum">
               <a:rPr lang="es-ES" smtClean="0"/>
-              <a:t>‹Nr.›</a:t>
+              <a:t>‹#›</a:t>
             </a:fld>
             <a:endParaRPr lang="es-ES"/>
           </a:p>
@@ -458,7 +474,7 @@
           <a:p>
             <a:fld id="{2B812C4B-C41B-974A-BF45-1844492AFCF9}" type="datetimeFigureOut">
               <a:rPr lang="es-ES" smtClean="0"/>
-              <a:t>25/10/16</a:t>
+              <a:t>31/1/17</a:t>
             </a:fld>
             <a:endParaRPr lang="es-ES"/>
           </a:p>
@@ -500,7 +516,7 @@
           <a:p>
             <a:fld id="{5D4D0645-9ACD-C847-B29C-B56C0E1FB878}" type="slidenum">
               <a:rPr lang="es-ES" smtClean="0"/>
-              <a:t>‹Nr.›</a:t>
+              <a:t>‹#›</a:t>
             </a:fld>
             <a:endParaRPr lang="es-ES"/>
           </a:p>
@@ -638,7 +654,7 @@
           <a:p>
             <a:fld id="{2B812C4B-C41B-974A-BF45-1844492AFCF9}" type="datetimeFigureOut">
               <a:rPr lang="es-ES" smtClean="0"/>
-              <a:t>25/10/16</a:t>
+              <a:t>31/1/17</a:t>
             </a:fld>
             <a:endParaRPr lang="es-ES"/>
           </a:p>
@@ -680,7 +696,7 @@
           <a:p>
             <a:fld id="{5D4D0645-9ACD-C847-B29C-B56C0E1FB878}" type="slidenum">
               <a:rPr lang="es-ES" smtClean="0"/>
-              <a:t>‹Nr.›</a:t>
+              <a:t>‹#›</a:t>
             </a:fld>
             <a:endParaRPr lang="es-ES"/>
           </a:p>
@@ -808,7 +824,7 @@
           <a:p>
             <a:fld id="{2B812C4B-C41B-974A-BF45-1844492AFCF9}" type="datetimeFigureOut">
               <a:rPr lang="es-ES" smtClean="0"/>
-              <a:t>25/10/16</a:t>
+              <a:t>31/1/17</a:t>
             </a:fld>
             <a:endParaRPr lang="es-ES"/>
           </a:p>
@@ -850,7 +866,7 @@
           <a:p>
             <a:fld id="{5D4D0645-9ACD-C847-B29C-B56C0E1FB878}" type="slidenum">
               <a:rPr lang="es-ES" smtClean="0"/>
-              <a:t>‹Nr.›</a:t>
+              <a:t>‹#›</a:t>
             </a:fld>
             <a:endParaRPr lang="es-ES"/>
           </a:p>
@@ -1054,7 +1070,7 @@
           <a:p>
             <a:fld id="{2B812C4B-C41B-974A-BF45-1844492AFCF9}" type="datetimeFigureOut">
               <a:rPr lang="es-ES" smtClean="0"/>
-              <a:t>25/10/16</a:t>
+              <a:t>31/1/17</a:t>
             </a:fld>
             <a:endParaRPr lang="es-ES"/>
           </a:p>
@@ -1096,7 +1112,7 @@
           <a:p>
             <a:fld id="{5D4D0645-9ACD-C847-B29C-B56C0E1FB878}" type="slidenum">
               <a:rPr lang="es-ES" smtClean="0"/>
-              <a:t>‹Nr.›</a:t>
+              <a:t>‹#›</a:t>
             </a:fld>
             <a:endParaRPr lang="es-ES"/>
           </a:p>
@@ -1342,7 +1358,7 @@
           <a:p>
             <a:fld id="{2B812C4B-C41B-974A-BF45-1844492AFCF9}" type="datetimeFigureOut">
               <a:rPr lang="es-ES" smtClean="0"/>
-              <a:t>25/10/16</a:t>
+              <a:t>31/1/17</a:t>
             </a:fld>
             <a:endParaRPr lang="es-ES"/>
           </a:p>
@@ -1384,7 +1400,7 @@
           <a:p>
             <a:fld id="{5D4D0645-9ACD-C847-B29C-B56C0E1FB878}" type="slidenum">
               <a:rPr lang="es-ES" smtClean="0"/>
-              <a:t>‹Nr.›</a:t>
+              <a:t>‹#›</a:t>
             </a:fld>
             <a:endParaRPr lang="es-ES"/>
           </a:p>
@@ -1764,7 +1780,7 @@
           <a:p>
             <a:fld id="{2B812C4B-C41B-974A-BF45-1844492AFCF9}" type="datetimeFigureOut">
               <a:rPr lang="es-ES" smtClean="0"/>
-              <a:t>25/10/16</a:t>
+              <a:t>31/1/17</a:t>
             </a:fld>
             <a:endParaRPr lang="es-ES"/>
           </a:p>
@@ -1806,7 +1822,7 @@
           <a:p>
             <a:fld id="{5D4D0645-9ACD-C847-B29C-B56C0E1FB878}" type="slidenum">
               <a:rPr lang="es-ES" smtClean="0"/>
-              <a:t>‹Nr.›</a:t>
+              <a:t>‹#›</a:t>
             </a:fld>
             <a:endParaRPr lang="es-ES"/>
           </a:p>
@@ -1882,7 +1898,7 @@
           <a:p>
             <a:fld id="{2B812C4B-C41B-974A-BF45-1844492AFCF9}" type="datetimeFigureOut">
               <a:rPr lang="es-ES" smtClean="0"/>
-              <a:t>25/10/16</a:t>
+              <a:t>31/1/17</a:t>
             </a:fld>
             <a:endParaRPr lang="es-ES"/>
           </a:p>
@@ -1924,7 +1940,7 @@
           <a:p>
             <a:fld id="{5D4D0645-9ACD-C847-B29C-B56C0E1FB878}" type="slidenum">
               <a:rPr lang="es-ES" smtClean="0"/>
-              <a:t>‹Nr.›</a:t>
+              <a:t>‹#›</a:t>
             </a:fld>
             <a:endParaRPr lang="es-ES"/>
           </a:p>
@@ -1977,7 +1993,7 @@
           <a:p>
             <a:fld id="{2B812C4B-C41B-974A-BF45-1844492AFCF9}" type="datetimeFigureOut">
               <a:rPr lang="es-ES" smtClean="0"/>
-              <a:t>25/10/16</a:t>
+              <a:t>31/1/17</a:t>
             </a:fld>
             <a:endParaRPr lang="es-ES"/>
           </a:p>
@@ -2019,7 +2035,7 @@
           <a:p>
             <a:fld id="{5D4D0645-9ACD-C847-B29C-B56C0E1FB878}" type="slidenum">
               <a:rPr lang="es-ES" smtClean="0"/>
-              <a:t>‹Nr.›</a:t>
+              <a:t>‹#›</a:t>
             </a:fld>
             <a:endParaRPr lang="es-ES"/>
           </a:p>
@@ -2254,7 +2270,7 @@
           <a:p>
             <a:fld id="{2B812C4B-C41B-974A-BF45-1844492AFCF9}" type="datetimeFigureOut">
               <a:rPr lang="es-ES" smtClean="0"/>
-              <a:t>25/10/16</a:t>
+              <a:t>31/1/17</a:t>
             </a:fld>
             <a:endParaRPr lang="es-ES"/>
           </a:p>
@@ -2296,7 +2312,7 @@
           <a:p>
             <a:fld id="{5D4D0645-9ACD-C847-B29C-B56C0E1FB878}" type="slidenum">
               <a:rPr lang="es-ES" smtClean="0"/>
-              <a:t>‹Nr.›</a:t>
+              <a:t>‹#›</a:t>
             </a:fld>
             <a:endParaRPr lang="es-ES"/>
           </a:p>
@@ -2507,7 +2523,7 @@
           <a:p>
             <a:fld id="{2B812C4B-C41B-974A-BF45-1844492AFCF9}" type="datetimeFigureOut">
               <a:rPr lang="es-ES" smtClean="0"/>
-              <a:t>25/10/16</a:t>
+              <a:t>31/1/17</a:t>
             </a:fld>
             <a:endParaRPr lang="es-ES"/>
           </a:p>
@@ -2549,7 +2565,7 @@
           <a:p>
             <a:fld id="{5D4D0645-9ACD-C847-B29C-B56C0E1FB878}" type="slidenum">
               <a:rPr lang="es-ES" smtClean="0"/>
-              <a:t>‹Nr.›</a:t>
+              <a:t>‹#›</a:t>
             </a:fld>
             <a:endParaRPr lang="es-ES"/>
           </a:p>
@@ -2720,7 +2736,7 @@
           <a:p>
             <a:fld id="{2B812C4B-C41B-974A-BF45-1844492AFCF9}" type="datetimeFigureOut">
               <a:rPr lang="es-ES" smtClean="0"/>
-              <a:t>25/10/16</a:t>
+              <a:t>31/1/17</a:t>
             </a:fld>
             <a:endParaRPr lang="es-ES"/>
           </a:p>
@@ -2798,7 +2814,7 @@
           <a:p>
             <a:fld id="{5D4D0645-9ACD-C847-B29C-B56C0E1FB878}" type="slidenum">
               <a:rPr lang="es-ES" smtClean="0"/>
-              <a:t>‹Nr.›</a:t>
+              <a:t>‹#›</a:t>
             </a:fld>
             <a:endParaRPr lang="es-ES"/>
           </a:p>
@@ -3132,52 +3148,19 @@
               <a:defRPr/>
             </a:pPr>
             <a:r>
-              <a:rPr lang="es-ES" sz="1200" kern="0" dirty="0" err="1">
-                <a:latin typeface="Arial"/>
-                <a:cs typeface="Arial"/>
-                <a:sym typeface="Arial"/>
-                <a:rtl val="0"/>
-              </a:rPr>
-              <a:t>IoT</a:t>
-            </a:r>
-            <a:r>
               <a:rPr lang="es-ES" sz="1200" kern="0" dirty="0">
                 <a:latin typeface="Arial"/>
                 <a:cs typeface="Arial"/>
                 <a:sym typeface="Arial"/>
                 <a:rtl val="0"/>
               </a:rPr>
-              <a:t> </a:t>
-            </a:r>
-            <a:r>
-              <a:rPr lang="es-ES" sz="1200" kern="0" dirty="0" err="1">
-                <a:latin typeface="Arial"/>
-                <a:cs typeface="Arial"/>
-                <a:sym typeface="Arial"/>
-                <a:rtl val="0"/>
-              </a:rPr>
-              <a:t>Backend</a:t>
-            </a:r>
-            <a:endParaRPr lang="es-ES" sz="1200" kern="0" dirty="0">
-              <a:latin typeface="Arial"/>
-              <a:cs typeface="Arial"/>
-              <a:sym typeface="Arial"/>
-              <a:rtl val="0"/>
-            </a:endParaRPr>
+              <a:t>IoT Backend</a:t>
+            </a:r>
           </a:p>
           <a:p>
             <a:pPr lvl="0" algn="ctr">
               <a:defRPr/>
             </a:pPr>
-            <a:r>
-              <a:rPr lang="es-ES" sz="1200" kern="0" dirty="0" err="1">
-                <a:latin typeface="Arial"/>
-                <a:cs typeface="Arial"/>
-                <a:sym typeface="Arial"/>
-                <a:rtl val="0"/>
-              </a:rPr>
-              <a:t>Device</a:t>
-            </a:r>
             <a:r>
               <a:rPr lang="es-ES" sz="1200" kern="0" dirty="0">
                 <a:latin typeface="Arial"/>
@@ -3185,7 +3168,7 @@
                 <a:sym typeface="Arial"/>
                 <a:rtl val="0"/>
               </a:rPr>
-              <a:t> Management</a:t>
+              <a:t>Device Management</a:t>
             </a:r>
           </a:p>
         </p:txBody>
@@ -4088,8 +4071,8 @@
         </p:nvSpPr>
         <p:spPr>
           <a:xfrm>
-            <a:off x="3626562" y="5252337"/>
-            <a:ext cx="1521502" cy="160570"/>
+            <a:off x="3683712" y="5275196"/>
+            <a:ext cx="1624268" cy="180000"/>
           </a:xfrm>
           <a:prstGeom prst="rect">
             <a:avLst/>
@@ -4101,7 +4084,7 @@
           </a:ln>
         </p:spPr>
         <p:txBody>
-          <a:bodyPr lIns="91425" tIns="91425" rIns="91425" bIns="91425" anchor="t" anchorCtr="0">
+          <a:bodyPr lIns="91425" tIns="25200" rIns="91425" bIns="91425" anchor="t" anchorCtr="0">
             <a:noAutofit/>
           </a:bodyPr>
           <a:lstStyle/>
@@ -5825,8 +5808,8 @@
         </p:nvSpPr>
         <p:spPr>
           <a:xfrm>
-            <a:off x="7235769" y="1215317"/>
-            <a:ext cx="1094400" cy="457200"/>
+            <a:off x="7201479" y="1272467"/>
+            <a:ext cx="1094400" cy="360000"/>
           </a:xfrm>
           <a:prstGeom prst="rect">
             <a:avLst/>
@@ -5843,7 +5826,7 @@
           </a:bodyPr>
           <a:lstStyle/>
           <a:p>
-            <a:pPr marL="0" marR="0" lvl="0" indent="0" defTabSz="914400" eaLnBrk="1" fontAlgn="auto" latinLnBrk="0" hangingPunct="1">
+            <a:pPr marL="0" marR="0" lvl="0" indent="0" algn="ctr" defTabSz="914400" eaLnBrk="1" fontAlgn="auto" latinLnBrk="0" hangingPunct="1">
               <a:lnSpc>
                 <a:spcPct val="100000"/>
               </a:lnSpc>
@@ -5861,7 +5844,7 @@
               <a:defRPr/>
             </a:pPr>
             <a:r>
-              <a:rPr kumimoji="0" lang="en" sz="1400" i="0" u="none" strike="noStrike" kern="0" cap="none" spc="0" normalizeH="0" baseline="0" noProof="0" smtClean="0">
+              <a:rPr kumimoji="0" lang="en" sz="1400" i="0" u="none" strike="noStrike" kern="0" cap="none" spc="0" normalizeH="0" baseline="0" noProof="0" dirty="0" smtClean="0">
                 <a:ln>
                   <a:noFill/>
                 </a:ln>
@@ -6694,7 +6677,7 @@
         </p:nvSpPr>
         <p:spPr>
           <a:xfrm>
-            <a:off x="5212777" y="2912461"/>
+            <a:off x="5212777" y="2935321"/>
             <a:ext cx="196627" cy="289785"/>
           </a:xfrm>
           <a:prstGeom prst="upDownArrow">
@@ -6832,6 +6815,13 @@
   <p:clrMapOvr>
     <a:masterClrMapping/>
   </p:clrMapOvr>
+  <p:timing>
+    <p:tnLst>
+      <p:par>
+        <p:cTn id="1" dur="indefinite" restart="never" nodeType="tmRoot"/>
+      </p:par>
+    </p:tnLst>
+  </p:timing>
 </p:sld>
 </file>
 

</xml_diff>